<commit_message>
Changed presentation fonts to Calibri Bold
</commit_message>
<xml_diff>
--- a/presentation/Firebrick+Black.pptx
+++ b/presentation/Firebrick+Black.pptx
@@ -3737,28 +3737,28 @@
           <a:lstStyle/>
           <a:p>
             <a:r>
-              <a:rPr lang="en-US" sz="6600" dirty="0">
+              <a:rPr lang="en-US" sz="6600" b="1" dirty="0">
                 <a:solidFill>
                   <a:schemeClr val="bg1"/>
                 </a:solidFill>
-                <a:latin typeface="Algerian" panose="04020705040A02060702" pitchFamily="82" charset="0"/>
+                <a:latin typeface="+mn-lt"/>
               </a:rPr>
               <a:t>GUN VIOLENCE</a:t>
             </a:r>
             <a:br>
-              <a:rPr lang="en-US" sz="6600" dirty="0">
+              <a:rPr lang="en-US" sz="6600" b="1" dirty="0">
                 <a:solidFill>
                   <a:schemeClr val="bg1"/>
                 </a:solidFill>
-                <a:latin typeface="Algerian" panose="04020705040A02060702" pitchFamily="82" charset="0"/>
+                <a:latin typeface="+mn-lt"/>
               </a:rPr>
             </a:br>
             <a:r>
-              <a:rPr lang="en-US" sz="6600" dirty="0">
+              <a:rPr lang="en-US" sz="6600" b="1" dirty="0">
                 <a:solidFill>
                   <a:schemeClr val="bg1"/>
                 </a:solidFill>
-                <a:latin typeface="Algerian" panose="04020705040A02060702" pitchFamily="82" charset="0"/>
+                <a:latin typeface="+mn-lt"/>
               </a:rPr>
               <a:t>UNCOVERED</a:t>
             </a:r>
@@ -3795,11 +3795,10 @@
           <a:p>
             <a:pPr algn="l"/>
             <a:r>
-              <a:rPr lang="en-US" sz="3200" dirty="0">
+              <a:rPr lang="en-US" sz="3200" b="1" dirty="0">
                 <a:solidFill>
                   <a:schemeClr val="bg1"/>
                 </a:solidFill>
-                <a:latin typeface="Algerian" panose="04020705040A02060702" pitchFamily="82" charset="0"/>
               </a:rPr>
               <a:t>Brought to you by</a:t>
             </a:r>
@@ -3811,11 +3810,10 @@
               </a:buBlip>
             </a:pPr>
             <a:r>
-              <a:rPr lang="en-US" sz="3200" dirty="0">
+              <a:rPr lang="en-US" sz="3200" b="1" dirty="0">
                 <a:solidFill>
                   <a:schemeClr val="bg1"/>
                 </a:solidFill>
-                <a:latin typeface="Algerian" panose="04020705040A02060702" pitchFamily="82" charset="0"/>
               </a:rPr>
               <a:t> Andrei Chaplygin</a:t>
             </a:r>
@@ -3827,11 +3825,10 @@
               </a:buBlip>
             </a:pPr>
             <a:r>
-              <a:rPr lang="en-US" sz="3200" dirty="0">
+              <a:rPr lang="en-US" sz="3200" b="1" dirty="0">
                 <a:solidFill>
                   <a:schemeClr val="bg1"/>
                 </a:solidFill>
-                <a:latin typeface="Algerian" panose="04020705040A02060702" pitchFamily="82" charset="0"/>
               </a:rPr>
               <a:t> Edgar Sanchez</a:t>
             </a:r>
@@ -3843,11 +3840,10 @@
               </a:buBlip>
             </a:pPr>
             <a:r>
-              <a:rPr lang="en-US" sz="3200" dirty="0">
+              <a:rPr lang="en-US" sz="3200" b="1" dirty="0">
                 <a:solidFill>
                   <a:schemeClr val="bg1"/>
                 </a:solidFill>
-                <a:latin typeface="Algerian" panose="04020705040A02060702" pitchFamily="82" charset="0"/>
               </a:rPr>
               <a:t> Craig Taylor</a:t>
             </a:r>
@@ -3859,11 +3855,10 @@
               </a:buBlip>
             </a:pPr>
             <a:r>
-              <a:rPr lang="en-US" sz="3200" dirty="0">
+              <a:rPr lang="en-US" sz="3200" b="1" dirty="0">
                 <a:solidFill>
                   <a:schemeClr val="bg1"/>
                 </a:solidFill>
-                <a:latin typeface="Algerian" panose="04020705040A02060702" pitchFamily="82" charset="0"/>
               </a:rPr>
               <a:t> Nathan Roberts</a:t>
             </a:r>
@@ -4542,11 +4537,11 @@
           <a:p>
             <a:pPr algn="ctr"/>
             <a:r>
-              <a:rPr lang="en-US" dirty="0">
+              <a:rPr lang="en-US" b="1" dirty="0">
                 <a:solidFill>
                   <a:schemeClr val="bg1"/>
                 </a:solidFill>
-                <a:latin typeface="Algerian" panose="04020705040A02060702" pitchFamily="82" charset="0"/>
+                <a:latin typeface="+mn-lt"/>
               </a:rPr>
               <a:t>THE STORY UNFINISHED</a:t>
             </a:r>
@@ -4602,11 +4597,11 @@
           <a:p>
             <a:pPr algn="ctr"/>
             <a:r>
-              <a:rPr lang="en-US" dirty="0">
+              <a:rPr lang="en-US" b="1" dirty="0">
                 <a:solidFill>
                   <a:schemeClr val="bg1"/>
                 </a:solidFill>
-                <a:latin typeface="Algerian" panose="04020705040A02060702" pitchFamily="82" charset="0"/>
+                <a:latin typeface="+mn-lt"/>
               </a:rPr>
               <a:t>Last time we’ve showed you these</a:t>
             </a:r>
@@ -4878,11 +4873,11 @@
           <a:p>
             <a:pPr algn="ctr"/>
             <a:r>
-              <a:rPr lang="en-US" dirty="0">
+              <a:rPr lang="en-US" b="1" dirty="0">
                 <a:solidFill>
                   <a:schemeClr val="bg1"/>
                 </a:solidFill>
-                <a:latin typeface="Algerian" panose="04020705040A02060702" pitchFamily="82" charset="0"/>
+                <a:latin typeface="+mn-lt"/>
               </a:rPr>
               <a:t>But what if you wanted these too?</a:t>
             </a:r>
@@ -4914,7 +4909,7 @@
         </p:spPr>
         <p:txBody>
           <a:bodyPr vert="horz" lIns="91440" tIns="45720" rIns="91440" bIns="45720" rtlCol="0" anchor="ctr">
-            <a:normAutofit fontScale="92500" lnSpcReduction="10000"/>
+            <a:normAutofit fontScale="92500"/>
           </a:bodyPr>
           <a:lstStyle>
             <a:lvl1pPr algn="l" defTabSz="914400" rtl="0" eaLnBrk="1" latinLnBrk="0" hangingPunct="1">
@@ -4938,11 +4933,11 @@
           <a:p>
             <a:pPr algn="ctr"/>
             <a:r>
-              <a:rPr lang="en-US" dirty="0">
+              <a:rPr lang="en-US" b="1" dirty="0">
                 <a:solidFill>
                   <a:schemeClr val="bg1"/>
                 </a:solidFill>
-                <a:latin typeface="Algerian" panose="04020705040A02060702" pitchFamily="82" charset="0"/>
+                <a:latin typeface="+mn-lt"/>
               </a:rPr>
               <a:t>Or just use different data for the same charts?</a:t>
             </a:r>
@@ -6195,11 +6190,11 @@
           <a:p>
             <a:pPr algn="ctr"/>
             <a:r>
-              <a:rPr lang="en-US" dirty="0">
+              <a:rPr lang="en-US" b="1" dirty="0">
                 <a:solidFill>
                   <a:schemeClr val="bg1"/>
                 </a:solidFill>
-                <a:latin typeface="Algerian" panose="04020705040A02060702" pitchFamily="82" charset="0"/>
+                <a:latin typeface="+mn-lt"/>
               </a:rPr>
               <a:t>We hear you</a:t>
             </a:r>
@@ -6231,7 +6226,7 @@
         </p:spPr>
         <p:txBody>
           <a:bodyPr vert="horz" lIns="91440" tIns="45720" rIns="91440" bIns="45720" rtlCol="0" anchor="ctr">
-            <a:normAutofit fontScale="92500"/>
+            <a:normAutofit/>
           </a:bodyPr>
           <a:lstStyle>
             <a:lvl1pPr algn="l" defTabSz="914400" rtl="0" eaLnBrk="1" latinLnBrk="0" hangingPunct="1">
@@ -6255,11 +6250,11 @@
           <a:p>
             <a:pPr algn="ctr"/>
             <a:r>
-              <a:rPr lang="en-US" dirty="0">
+              <a:rPr lang="en-US" b="1" dirty="0">
                 <a:solidFill>
                   <a:schemeClr val="bg1"/>
                 </a:solidFill>
-                <a:latin typeface="Algerian" panose="04020705040A02060702" pitchFamily="82" charset="0"/>
+                <a:latin typeface="+mn-lt"/>
               </a:rPr>
               <a:t>And we’ve prepared something cool</a:t>
             </a:r>
@@ -6406,47 +6401,47 @@
             </a:lstStyle>
             <a:p>
               <a:r>
-                <a:rPr lang="en-US" sz="3600" dirty="0">
+                <a:rPr lang="en-US" sz="3600" b="1" dirty="0">
                   <a:solidFill>
                     <a:schemeClr val="bg1"/>
                   </a:solidFill>
-                  <a:latin typeface="Algerian" panose="04020705040A02060702" pitchFamily="82" charset="0"/>
+                  <a:latin typeface="+mn-lt"/>
                 </a:rPr>
                 <a:t>More data: scraped from web using </a:t>
               </a:r>
               <a:r>
-                <a:rPr lang="en-US" sz="3600" dirty="0" err="1">
+                <a:rPr lang="en-US" sz="3600" b="1" dirty="0" err="1">
                   <a:solidFill>
                     <a:schemeClr val="bg1"/>
                   </a:solidFill>
-                  <a:latin typeface="Algerian" panose="04020705040A02060702" pitchFamily="82" charset="0"/>
+                  <a:latin typeface="+mn-lt"/>
                 </a:rPr>
                 <a:t>beautifulsoup</a:t>
               </a:r>
               <a:r>
-                <a:rPr lang="en-US" sz="3600" dirty="0">
+                <a:rPr lang="en-US" sz="3600" b="1" dirty="0">
                   <a:solidFill>
                     <a:schemeClr val="bg1"/>
                   </a:solidFill>
-                  <a:latin typeface="Algerian" panose="04020705040A02060702" pitchFamily="82" charset="0"/>
+                  <a:latin typeface="+mn-lt"/>
                 </a:rPr>
                 <a:t> and stored in </a:t>
               </a:r>
               <a:r>
-                <a:rPr lang="en-US" sz="3600" dirty="0" err="1">
+                <a:rPr lang="en-US" sz="3600" b="1" dirty="0" err="1">
                   <a:solidFill>
                     <a:schemeClr val="bg1"/>
                   </a:solidFill>
-                  <a:latin typeface="Algerian" panose="04020705040A02060702" pitchFamily="82" charset="0"/>
+                  <a:latin typeface="+mn-lt"/>
                 </a:rPr>
                 <a:t>sqlite</a:t>
               </a:r>
               <a:r>
-                <a:rPr lang="en-US" sz="3600" dirty="0">
+                <a:rPr lang="en-US" sz="3600" b="1" dirty="0">
                   <a:solidFill>
                     <a:schemeClr val="bg1"/>
                   </a:solidFill>
-                  <a:latin typeface="Algerian" panose="04020705040A02060702" pitchFamily="82" charset="0"/>
+                  <a:latin typeface="+mn-lt"/>
                 </a:rPr>
                 <a:t> DB </a:t>
               </a:r>
@@ -6558,29 +6553,29 @@
             </a:lstStyle>
             <a:p>
               <a:r>
-                <a:rPr lang="en-US" sz="3600" dirty="0">
+                <a:rPr lang="en-US" sz="3600" b="1" dirty="0">
                   <a:solidFill>
                     <a:schemeClr val="bg1"/>
                   </a:solidFill>
-                  <a:latin typeface="Algerian" panose="04020705040A02060702" pitchFamily="82" charset="0"/>
+                  <a:latin typeface="+mn-lt"/>
                 </a:rPr>
                 <a:t>Drag, DROP and resize thanks to </a:t>
               </a:r>
               <a:r>
-                <a:rPr lang="en-US" sz="3600" dirty="0" err="1">
+                <a:rPr lang="en-US" sz="3600" b="1" dirty="0" err="1">
                   <a:solidFill>
                     <a:schemeClr val="bg1"/>
                   </a:solidFill>
-                  <a:latin typeface="Algerian" panose="04020705040A02060702" pitchFamily="82" charset="0"/>
+                  <a:latin typeface="+mn-lt"/>
                 </a:rPr>
                 <a:t>jquery</a:t>
               </a:r>
               <a:r>
-                <a:rPr lang="en-US" sz="3600" dirty="0">
+                <a:rPr lang="en-US" sz="3600" b="1" dirty="0">
                   <a:solidFill>
                     <a:schemeClr val="bg1"/>
                   </a:solidFill>
-                  <a:latin typeface="Algerian" panose="04020705040A02060702" pitchFamily="82" charset="0"/>
+                  <a:latin typeface="+mn-lt"/>
                 </a:rPr>
                 <a:t> and gridstack.js</a:t>
               </a:r>
@@ -6664,7 +6659,7 @@
           <p:spPr>
             <a:xfrm>
               <a:off x="488620" y="3648374"/>
-              <a:ext cx="8377220" cy="1110342"/>
+              <a:ext cx="8500236" cy="1110342"/>
             </a:xfrm>
             <a:prstGeom prst="rect">
               <a:avLst/>
@@ -6695,20 +6690,20 @@
             </a:lstStyle>
             <a:p>
               <a:r>
-                <a:rPr lang="en-US" sz="3600" dirty="0" err="1">
+                <a:rPr lang="en-US" sz="3600" b="1" dirty="0" err="1">
                   <a:solidFill>
                     <a:schemeClr val="bg1"/>
                   </a:solidFill>
-                  <a:latin typeface="Algerian" panose="04020705040A02060702" pitchFamily="82" charset="0"/>
+                  <a:latin typeface="+mn-lt"/>
                 </a:rPr>
                 <a:t>STATE-of-the-art</a:t>
               </a:r>
               <a:r>
-                <a:rPr lang="en-US" sz="3600" dirty="0">
+                <a:rPr lang="en-US" sz="3600" b="1" dirty="0">
                   <a:solidFill>
                     <a:schemeClr val="bg1"/>
                   </a:solidFill>
-                  <a:latin typeface="Algerian" panose="04020705040A02060702" pitchFamily="82" charset="0"/>
+                  <a:latin typeface="+mn-lt"/>
                 </a:rPr>
                 <a:t> charts powered by plotly.js</a:t>
               </a:r>
@@ -6892,13 +6887,13 @@
             </a:lstStyle>
             <a:p>
               <a:r>
-                <a:rPr lang="en-US" sz="3600" dirty="0">
+                <a:rPr lang="en-US" sz="3600" b="1" dirty="0">
                   <a:solidFill>
                     <a:schemeClr val="bg1"/>
                   </a:solidFill>
-                  <a:latin typeface="Algerian" panose="04020705040A02060702" pitchFamily="82" charset="0"/>
+                  <a:latin typeface="+mn-lt"/>
                 </a:rPr>
-                <a:t>And a little surprise COOKED WITH d3.js</a:t>
+                <a:t>And a little surprise cooked with d3.js</a:t>
               </a:r>
             </a:p>
           </p:txBody>
@@ -7550,11 +7545,11 @@
           <a:p>
             <a:pPr algn="ctr"/>
             <a:r>
-              <a:rPr lang="en-US" sz="8800" dirty="0">
+              <a:rPr lang="en-US" sz="8800" b="1" dirty="0">
                 <a:solidFill>
                   <a:schemeClr val="bg1"/>
                 </a:solidFill>
-                <a:latin typeface="Algerian" panose="04020705040A02060702" pitchFamily="82" charset="0"/>
+                <a:latin typeface="+mn-lt"/>
               </a:rPr>
               <a:t>Demo</a:t>
             </a:r>

</xml_diff>